<commit_message>
Adding doc to MBED Project MIDI2DMX
</commit_message>
<xml_diff>
--- a/Villou_MIDI_TO_DMX_vAnniv/doc/Description.pptx
+++ b/Villou_MIDI_TO_DMX_vAnniv/doc/Description.pptx
@@ -23295,6 +23295,251 @@
         <p:spPr>
           <a:xfrm>
             <a:off x="4937021" y="5759931"/>
+            <a:ext cx="285134" cy="281411"/>
+          </a:xfrm>
+          <a:prstGeom prst="ellipse">
+            <a:avLst/>
+          </a:prstGeom>
+          <a:solidFill>
+            <a:srgbClr val="FF0000"/>
+          </a:solidFill>
+        </p:spPr>
+        <p:style>
+          <a:lnRef idx="2">
+            <a:schemeClr val="accent1">
+              <a:shade val="50000"/>
+            </a:schemeClr>
+          </a:lnRef>
+          <a:fillRef idx="1">
+            <a:schemeClr val="accent1"/>
+          </a:fillRef>
+          <a:effectRef idx="0">
+            <a:schemeClr val="accent1"/>
+          </a:effectRef>
+          <a:fontRef idx="minor">
+            <a:schemeClr val="lt1"/>
+          </a:fontRef>
+        </p:style>
+        <p:txBody>
+          <a:bodyPr rtlCol="0" anchor="ctr"/>
+          <a:lstStyle/>
+          <a:p>
+            <a:pPr algn="ctr"/>
+            <a:endParaRPr lang="fr-FR"/>
+          </a:p>
+        </p:txBody>
+      </p:sp>
+      <p:sp>
+        <p:nvSpPr>
+          <p:cNvPr id="70" name="Ellipse 69">
+            <a:extLst>
+              <a:ext uri="{FF2B5EF4-FFF2-40B4-BE49-F238E27FC236}">
+                <a16:creationId xmlns:a16="http://schemas.microsoft.com/office/drawing/2014/main" id="{E742E88A-C40F-EE5B-4421-B4B4D8D284B0}"/>
+              </a:ext>
+            </a:extLst>
+          </p:cNvPr>
+          <p:cNvSpPr/>
+          <p:nvPr/>
+        </p:nvSpPr>
+        <p:spPr>
+          <a:xfrm>
+            <a:off x="13187" y="5121735"/>
+            <a:ext cx="285134" cy="281411"/>
+          </a:xfrm>
+          <a:prstGeom prst="ellipse">
+            <a:avLst/>
+          </a:prstGeom>
+          <a:solidFill>
+            <a:srgbClr val="FF0000"/>
+          </a:solidFill>
+        </p:spPr>
+        <p:style>
+          <a:lnRef idx="2">
+            <a:schemeClr val="accent1">
+              <a:shade val="50000"/>
+            </a:schemeClr>
+          </a:lnRef>
+          <a:fillRef idx="1">
+            <a:schemeClr val="accent1"/>
+          </a:fillRef>
+          <a:effectRef idx="0">
+            <a:schemeClr val="accent1"/>
+          </a:effectRef>
+          <a:fontRef idx="minor">
+            <a:schemeClr val="lt1"/>
+          </a:fontRef>
+        </p:style>
+        <p:txBody>
+          <a:bodyPr rtlCol="0" anchor="ctr"/>
+          <a:lstStyle/>
+          <a:p>
+            <a:pPr algn="ctr"/>
+            <a:endParaRPr lang="fr-FR"/>
+          </a:p>
+        </p:txBody>
+      </p:sp>
+      <p:sp>
+        <p:nvSpPr>
+          <p:cNvPr id="83" name="Ellipse 82">
+            <a:extLst>
+              <a:ext uri="{FF2B5EF4-FFF2-40B4-BE49-F238E27FC236}">
+                <a16:creationId xmlns:a16="http://schemas.microsoft.com/office/drawing/2014/main" id="{88B98594-E635-5EDA-074F-18E042D9CA7D}"/>
+              </a:ext>
+            </a:extLst>
+          </p:cNvPr>
+          <p:cNvSpPr/>
+          <p:nvPr/>
+        </p:nvSpPr>
+        <p:spPr>
+          <a:xfrm>
+            <a:off x="2665425" y="5093036"/>
+            <a:ext cx="285134" cy="281411"/>
+          </a:xfrm>
+          <a:prstGeom prst="ellipse">
+            <a:avLst/>
+          </a:prstGeom>
+          <a:solidFill>
+            <a:srgbClr val="FF0000"/>
+          </a:solidFill>
+        </p:spPr>
+        <p:style>
+          <a:lnRef idx="2">
+            <a:schemeClr val="accent1">
+              <a:shade val="50000"/>
+            </a:schemeClr>
+          </a:lnRef>
+          <a:fillRef idx="1">
+            <a:schemeClr val="accent1"/>
+          </a:fillRef>
+          <a:effectRef idx="0">
+            <a:schemeClr val="accent1"/>
+          </a:effectRef>
+          <a:fontRef idx="minor">
+            <a:schemeClr val="lt1"/>
+          </a:fontRef>
+        </p:style>
+        <p:txBody>
+          <a:bodyPr rtlCol="0" anchor="ctr"/>
+          <a:lstStyle/>
+          <a:p>
+            <a:pPr algn="ctr"/>
+            <a:endParaRPr lang="fr-FR"/>
+          </a:p>
+        </p:txBody>
+      </p:sp>
+      <p:sp>
+        <p:nvSpPr>
+          <p:cNvPr id="84" name="Ellipse 83">
+            <a:extLst>
+              <a:ext uri="{FF2B5EF4-FFF2-40B4-BE49-F238E27FC236}">
+                <a16:creationId xmlns:a16="http://schemas.microsoft.com/office/drawing/2014/main" id="{9EFEB3B4-A83A-A284-8CB7-A71E04650BB2}"/>
+              </a:ext>
+            </a:extLst>
+          </p:cNvPr>
+          <p:cNvSpPr/>
+          <p:nvPr/>
+        </p:nvSpPr>
+        <p:spPr>
+          <a:xfrm>
+            <a:off x="871626" y="5099474"/>
+            <a:ext cx="285134" cy="281411"/>
+          </a:xfrm>
+          <a:prstGeom prst="ellipse">
+            <a:avLst/>
+          </a:prstGeom>
+          <a:solidFill>
+            <a:srgbClr val="FF0000"/>
+          </a:solidFill>
+        </p:spPr>
+        <p:style>
+          <a:lnRef idx="2">
+            <a:schemeClr val="accent1">
+              <a:shade val="50000"/>
+            </a:schemeClr>
+          </a:lnRef>
+          <a:fillRef idx="1">
+            <a:schemeClr val="accent1"/>
+          </a:fillRef>
+          <a:effectRef idx="0">
+            <a:schemeClr val="accent1"/>
+          </a:effectRef>
+          <a:fontRef idx="minor">
+            <a:schemeClr val="lt1"/>
+          </a:fontRef>
+        </p:style>
+        <p:txBody>
+          <a:bodyPr rtlCol="0" anchor="ctr"/>
+          <a:lstStyle/>
+          <a:p>
+            <a:pPr algn="ctr"/>
+            <a:endParaRPr lang="fr-FR"/>
+          </a:p>
+        </p:txBody>
+      </p:sp>
+      <p:sp>
+        <p:nvSpPr>
+          <p:cNvPr id="85" name="Ellipse 84">
+            <a:extLst>
+              <a:ext uri="{FF2B5EF4-FFF2-40B4-BE49-F238E27FC236}">
+                <a16:creationId xmlns:a16="http://schemas.microsoft.com/office/drawing/2014/main" id="{8C62AA91-6B9E-E3F2-0D5A-1814D5B83181}"/>
+              </a:ext>
+            </a:extLst>
+          </p:cNvPr>
+          <p:cNvSpPr/>
+          <p:nvPr/>
+        </p:nvSpPr>
+        <p:spPr>
+          <a:xfrm>
+            <a:off x="1828818" y="5121394"/>
+            <a:ext cx="285134" cy="281411"/>
+          </a:xfrm>
+          <a:prstGeom prst="ellipse">
+            <a:avLst/>
+          </a:prstGeom>
+          <a:solidFill>
+            <a:srgbClr val="FF0000"/>
+          </a:solidFill>
+        </p:spPr>
+        <p:style>
+          <a:lnRef idx="2">
+            <a:schemeClr val="accent1">
+              <a:shade val="50000"/>
+            </a:schemeClr>
+          </a:lnRef>
+          <a:fillRef idx="1">
+            <a:schemeClr val="accent1"/>
+          </a:fillRef>
+          <a:effectRef idx="0">
+            <a:schemeClr val="accent1"/>
+          </a:effectRef>
+          <a:fontRef idx="minor">
+            <a:schemeClr val="lt1"/>
+          </a:fontRef>
+        </p:style>
+        <p:txBody>
+          <a:bodyPr rtlCol="0" anchor="ctr"/>
+          <a:lstStyle/>
+          <a:p>
+            <a:pPr algn="ctr"/>
+            <a:endParaRPr lang="fr-FR"/>
+          </a:p>
+        </p:txBody>
+      </p:sp>
+      <p:sp>
+        <p:nvSpPr>
+          <p:cNvPr id="86" name="Ellipse 85">
+            <a:extLst>
+              <a:ext uri="{FF2B5EF4-FFF2-40B4-BE49-F238E27FC236}">
+                <a16:creationId xmlns:a16="http://schemas.microsoft.com/office/drawing/2014/main" id="{D84A6A9F-2D59-F1B7-275C-46604D44D199}"/>
+              </a:ext>
+            </a:extLst>
+          </p:cNvPr>
+          <p:cNvSpPr/>
+          <p:nvPr/>
+        </p:nvSpPr>
+        <p:spPr>
+          <a:xfrm>
+            <a:off x="4078582" y="6435580"/>
             <a:ext cx="285134" cy="281411"/>
           </a:xfrm>
           <a:prstGeom prst="ellipse">

</xml_diff>